<commit_message>
[WR A] Presentazione completa modificata: parti approvate BARBA e MICCO
</commit_message>
<xml_diff>
--- a/Presentazione/Atsilo1/Barba/Atsilo_A_PresentazioneAntonio Barba.pptx
+++ b/Presentazione/Atsilo1/Barba/Atsilo_A_PresentazioneAntonio Barba.pptx
@@ -207,7 +207,7 @@
             <a:fld id="{38D78F4D-402C-46E0-A4BB-DF91EA86B14C}" type="datetimeFigureOut">
               <a:rPr lang="it-IT" smtClean="0"/>
               <a:pPr/>
-              <a:t>29/12/2012</a:t>
+              <a:t>29/12/12</a:t>
             </a:fld>
             <a:endParaRPr lang="it-IT"/>
           </a:p>
@@ -367,7 +367,7 @@
             <a:fld id="{D70604CA-7593-4640-8FA1-5523937B8510}" type="slidenum">
               <a:rPr lang="it-IT" smtClean="0"/>
               <a:pPr/>
-              <a:t>‹N›</a:t>
+              <a:t>‹n.›</a:t>
             </a:fld>
             <a:endParaRPr lang="it-IT"/>
           </a:p>
@@ -376,7 +376,7 @@
     </p:spTree>
     <p:extLst>
       <p:ext uri="{BB962C8B-B14F-4D97-AF65-F5344CB8AC3E}">
-        <p14:creationId xmlns="" xmlns:p14="http://schemas.microsoft.com/office/powerpoint/2010/main" val="2126419590"/>
+        <p14:creationId xmlns:p14="http://schemas.microsoft.com/office/powerpoint/2010/main" val="2126419590"/>
       </p:ext>
     </p:extLst>
   </p:cSld>
@@ -642,7 +642,7 @@
             <a:fld id="{63CABBC0-75E4-43BB-A6A6-84C2A96BDB82}" type="datetimeFigureOut">
               <a:rPr lang="it-IT" smtClean="0"/>
               <a:pPr/>
-              <a:t>29/12/2012</a:t>
+              <a:t>29/12/12</a:t>
             </a:fld>
             <a:endParaRPr lang="it-IT"/>
           </a:p>
@@ -685,7 +685,7 @@
             <a:fld id="{F89AEA99-3E91-4C58-9AD4-045DB5619AC3}" type="slidenum">
               <a:rPr lang="it-IT" smtClean="0"/>
               <a:pPr/>
-              <a:t>‹N›</a:t>
+              <a:t>‹n.›</a:t>
             </a:fld>
             <a:endParaRPr lang="it-IT"/>
           </a:p>
@@ -699,7 +699,7 @@
   <p:timing>
     <p:tnLst>
       <p:par>
-        <p:cTn id="1" dur="indefinite" restart="never" nodeType="tmRoot"/>
+        <p:cTn xmlns:p14="http://schemas.microsoft.com/office/powerpoint/2010/main" id="1" dur="indefinite" restart="never" nodeType="tmRoot"/>
       </p:par>
     </p:tnLst>
   </p:timing>
@@ -824,7 +824,7 @@
             <a:fld id="{63CABBC0-75E4-43BB-A6A6-84C2A96BDB82}" type="datetimeFigureOut">
               <a:rPr lang="it-IT" smtClean="0"/>
               <a:pPr/>
-              <a:t>29/12/2012</a:t>
+              <a:t>29/12/12</a:t>
             </a:fld>
             <a:endParaRPr lang="it-IT"/>
           </a:p>
@@ -867,7 +867,7 @@
             <a:fld id="{F89AEA99-3E91-4C58-9AD4-045DB5619AC3}" type="slidenum">
               <a:rPr lang="it-IT" smtClean="0"/>
               <a:pPr/>
-              <a:t>‹N›</a:t>
+              <a:t>‹n.›</a:t>
             </a:fld>
             <a:endParaRPr lang="it-IT"/>
           </a:p>
@@ -881,7 +881,7 @@
   <p:timing>
     <p:tnLst>
       <p:par>
-        <p:cTn id="1" dur="indefinite" restart="never" nodeType="tmRoot"/>
+        <p:cTn xmlns:p14="http://schemas.microsoft.com/office/powerpoint/2010/main" id="1" dur="indefinite" restart="never" nodeType="tmRoot"/>
       </p:par>
     </p:tnLst>
   </p:timing>
@@ -1016,7 +1016,7 @@
             <a:fld id="{63CABBC0-75E4-43BB-A6A6-84C2A96BDB82}" type="datetimeFigureOut">
               <a:rPr lang="it-IT" smtClean="0"/>
               <a:pPr/>
-              <a:t>29/12/2012</a:t>
+              <a:t>29/12/12</a:t>
             </a:fld>
             <a:endParaRPr lang="it-IT"/>
           </a:p>
@@ -1059,7 +1059,7 @@
             <a:fld id="{F89AEA99-3E91-4C58-9AD4-045DB5619AC3}" type="slidenum">
               <a:rPr lang="it-IT" smtClean="0"/>
               <a:pPr/>
-              <a:t>‹N›</a:t>
+              <a:t>‹n.›</a:t>
             </a:fld>
             <a:endParaRPr lang="it-IT"/>
           </a:p>
@@ -1073,7 +1073,7 @@
   <p:timing>
     <p:tnLst>
       <p:par>
-        <p:cTn id="1" dur="indefinite" restart="never" nodeType="tmRoot"/>
+        <p:cTn xmlns:p14="http://schemas.microsoft.com/office/powerpoint/2010/main" id="1" dur="indefinite" restart="never" nodeType="tmRoot"/>
       </p:par>
     </p:tnLst>
   </p:timing>
@@ -1198,7 +1198,7 @@
             <a:fld id="{63CABBC0-75E4-43BB-A6A6-84C2A96BDB82}" type="datetimeFigureOut">
               <a:rPr lang="it-IT" smtClean="0"/>
               <a:pPr/>
-              <a:t>29/12/2012</a:t>
+              <a:t>29/12/12</a:t>
             </a:fld>
             <a:endParaRPr lang="it-IT"/>
           </a:p>
@@ -1241,7 +1241,7 @@
             <a:fld id="{F89AEA99-3E91-4C58-9AD4-045DB5619AC3}" type="slidenum">
               <a:rPr lang="it-IT" smtClean="0"/>
               <a:pPr/>
-              <a:t>‹N›</a:t>
+              <a:t>‹n.›</a:t>
             </a:fld>
             <a:endParaRPr lang="it-IT"/>
           </a:p>
@@ -1255,7 +1255,7 @@
   <p:timing>
     <p:tnLst>
       <p:par>
-        <p:cTn id="1" dur="indefinite" restart="never" nodeType="tmRoot"/>
+        <p:cTn xmlns:p14="http://schemas.microsoft.com/office/powerpoint/2010/main" id="1" dur="indefinite" restart="never" nodeType="tmRoot"/>
       </p:par>
     </p:tnLst>
   </p:timing>
@@ -1441,7 +1441,7 @@
             <a:fld id="{63CABBC0-75E4-43BB-A6A6-84C2A96BDB82}" type="datetimeFigureOut">
               <a:rPr lang="it-IT" smtClean="0"/>
               <a:pPr/>
-              <a:t>29/12/2012</a:t>
+              <a:t>29/12/12</a:t>
             </a:fld>
             <a:endParaRPr lang="it-IT"/>
           </a:p>
@@ -1484,7 +1484,7 @@
             <a:fld id="{F89AEA99-3E91-4C58-9AD4-045DB5619AC3}" type="slidenum">
               <a:rPr lang="it-IT" smtClean="0"/>
               <a:pPr/>
-              <a:t>‹N›</a:t>
+              <a:t>‹n.›</a:t>
             </a:fld>
             <a:endParaRPr lang="it-IT"/>
           </a:p>
@@ -1498,7 +1498,7 @@
   <p:timing>
     <p:tnLst>
       <p:par>
-        <p:cTn id="1" dur="indefinite" restart="never" nodeType="tmRoot"/>
+        <p:cTn xmlns:p14="http://schemas.microsoft.com/office/powerpoint/2010/main" id="1" dur="indefinite" restart="never" nodeType="tmRoot"/>
       </p:par>
     </p:tnLst>
   </p:timing>
@@ -1722,7 +1722,7 @@
             <a:fld id="{63CABBC0-75E4-43BB-A6A6-84C2A96BDB82}" type="datetimeFigureOut">
               <a:rPr lang="it-IT" smtClean="0"/>
               <a:pPr/>
-              <a:t>29/12/2012</a:t>
+              <a:t>29/12/12</a:t>
             </a:fld>
             <a:endParaRPr lang="it-IT"/>
           </a:p>
@@ -1765,7 +1765,7 @@
             <a:fld id="{F89AEA99-3E91-4C58-9AD4-045DB5619AC3}" type="slidenum">
               <a:rPr lang="it-IT" smtClean="0"/>
               <a:pPr/>
-              <a:t>‹N›</a:t>
+              <a:t>‹n.›</a:t>
             </a:fld>
             <a:endParaRPr lang="it-IT"/>
           </a:p>
@@ -1779,7 +1779,7 @@
   <p:timing>
     <p:tnLst>
       <p:par>
-        <p:cTn id="1" dur="indefinite" restart="never" nodeType="tmRoot"/>
+        <p:cTn xmlns:p14="http://schemas.microsoft.com/office/powerpoint/2010/main" id="1" dur="indefinite" restart="never" nodeType="tmRoot"/>
       </p:par>
     </p:tnLst>
   </p:timing>
@@ -2113,7 +2113,7 @@
             <a:fld id="{63CABBC0-75E4-43BB-A6A6-84C2A96BDB82}" type="datetimeFigureOut">
               <a:rPr lang="it-IT" smtClean="0"/>
               <a:pPr/>
-              <a:t>29/12/2012</a:t>
+              <a:t>29/12/12</a:t>
             </a:fld>
             <a:endParaRPr lang="it-IT"/>
           </a:p>
@@ -2156,7 +2156,7 @@
             <a:fld id="{F89AEA99-3E91-4C58-9AD4-045DB5619AC3}" type="slidenum">
               <a:rPr lang="it-IT" smtClean="0"/>
               <a:pPr/>
-              <a:t>‹N›</a:t>
+              <a:t>‹n.›</a:t>
             </a:fld>
             <a:endParaRPr lang="it-IT"/>
           </a:p>
@@ -2170,7 +2170,7 @@
   <p:timing>
     <p:tnLst>
       <p:par>
-        <p:cTn id="1" dur="indefinite" restart="never" nodeType="tmRoot"/>
+        <p:cTn xmlns:p14="http://schemas.microsoft.com/office/powerpoint/2010/main" id="1" dur="indefinite" restart="never" nodeType="tmRoot"/>
       </p:par>
     </p:tnLst>
   </p:timing>
@@ -2272,7 +2272,7 @@
             <a:fld id="{63CABBC0-75E4-43BB-A6A6-84C2A96BDB82}" type="datetimeFigureOut">
               <a:rPr lang="it-IT" smtClean="0"/>
               <a:pPr/>
-              <a:t>29/12/2012</a:t>
+              <a:t>29/12/12</a:t>
             </a:fld>
             <a:endParaRPr lang="it-IT"/>
           </a:p>
@@ -2315,7 +2315,7 @@
             <a:fld id="{F89AEA99-3E91-4C58-9AD4-045DB5619AC3}" type="slidenum">
               <a:rPr lang="it-IT" smtClean="0"/>
               <a:pPr/>
-              <a:t>‹N›</a:t>
+              <a:t>‹n.›</a:t>
             </a:fld>
             <a:endParaRPr lang="it-IT"/>
           </a:p>
@@ -2329,7 +2329,7 @@
   <p:timing>
     <p:tnLst>
       <p:par>
-        <p:cTn id="1" dur="indefinite" restart="never" nodeType="tmRoot"/>
+        <p:cTn xmlns:p14="http://schemas.microsoft.com/office/powerpoint/2010/main" id="1" dur="indefinite" restart="never" nodeType="tmRoot"/>
       </p:par>
     </p:tnLst>
   </p:timing>
@@ -2371,7 +2371,7 @@
             <a:fld id="{63CABBC0-75E4-43BB-A6A6-84C2A96BDB82}" type="datetimeFigureOut">
               <a:rPr lang="it-IT" smtClean="0"/>
               <a:pPr/>
-              <a:t>29/12/2012</a:t>
+              <a:t>29/12/12</a:t>
             </a:fld>
             <a:endParaRPr lang="it-IT"/>
           </a:p>
@@ -2414,7 +2414,7 @@
             <a:fld id="{F89AEA99-3E91-4C58-9AD4-045DB5619AC3}" type="slidenum">
               <a:rPr lang="it-IT" smtClean="0"/>
               <a:pPr/>
-              <a:t>‹N›</a:t>
+              <a:t>‹n.›</a:t>
             </a:fld>
             <a:endParaRPr lang="it-IT"/>
           </a:p>
@@ -2428,7 +2428,7 @@
   <p:timing>
     <p:tnLst>
       <p:par>
-        <p:cTn id="1" dur="indefinite" restart="never" nodeType="tmRoot"/>
+        <p:cTn xmlns:p14="http://schemas.microsoft.com/office/powerpoint/2010/main" id="1" dur="indefinite" restart="never" nodeType="tmRoot"/>
       </p:par>
     </p:tnLst>
   </p:timing>
@@ -2641,7 +2641,7 @@
             <a:fld id="{63CABBC0-75E4-43BB-A6A6-84C2A96BDB82}" type="datetimeFigureOut">
               <a:rPr lang="it-IT" smtClean="0"/>
               <a:pPr/>
-              <a:t>29/12/2012</a:t>
+              <a:t>29/12/12</a:t>
             </a:fld>
             <a:endParaRPr lang="it-IT"/>
           </a:p>
@@ -2684,7 +2684,7 @@
             <a:fld id="{F89AEA99-3E91-4C58-9AD4-045DB5619AC3}" type="slidenum">
               <a:rPr lang="it-IT" smtClean="0"/>
               <a:pPr/>
-              <a:t>‹N›</a:t>
+              <a:t>‹n.›</a:t>
             </a:fld>
             <a:endParaRPr lang="it-IT"/>
           </a:p>
@@ -2698,7 +2698,7 @@
   <p:timing>
     <p:tnLst>
       <p:par>
-        <p:cTn id="1" dur="indefinite" restart="never" nodeType="tmRoot"/>
+        <p:cTn xmlns:p14="http://schemas.microsoft.com/office/powerpoint/2010/main" id="1" dur="indefinite" restart="never" nodeType="tmRoot"/>
       </p:par>
     </p:tnLst>
   </p:timing>
@@ -2938,7 +2938,7 @@
             <a:fld id="{63CABBC0-75E4-43BB-A6A6-84C2A96BDB82}" type="datetimeFigureOut">
               <a:rPr lang="it-IT" smtClean="0"/>
               <a:pPr/>
-              <a:t>29/12/2012</a:t>
+              <a:t>29/12/12</a:t>
             </a:fld>
             <a:endParaRPr lang="it-IT"/>
           </a:p>
@@ -2986,7 +2986,7 @@
             <a:fld id="{F89AEA99-3E91-4C58-9AD4-045DB5619AC3}" type="slidenum">
               <a:rPr lang="it-IT" smtClean="0"/>
               <a:pPr/>
-              <a:t>‹N›</a:t>
+              <a:t>‹n.›</a:t>
             </a:fld>
             <a:endParaRPr lang="it-IT"/>
           </a:p>
@@ -3302,7 +3302,7 @@
   <p:timing>
     <p:tnLst>
       <p:par>
-        <p:cTn id="1" dur="indefinite" restart="never" nodeType="tmRoot"/>
+        <p:cTn xmlns:p14="http://schemas.microsoft.com/office/powerpoint/2010/main" id="1" dur="indefinite" restart="never" nodeType="tmRoot"/>
       </p:par>
     </p:tnLst>
   </p:timing>
@@ -3718,7 +3718,7 @@
             <a:fld id="{63CABBC0-75E4-43BB-A6A6-84C2A96BDB82}" type="datetimeFigureOut">
               <a:rPr lang="it-IT" smtClean="0"/>
               <a:pPr/>
-              <a:t>29/12/2012</a:t>
+              <a:t>29/12/12</a:t>
             </a:fld>
             <a:endParaRPr lang="it-IT"/>
           </a:p>
@@ -3797,7 +3797,7 @@
             <a:fld id="{F89AEA99-3E91-4C58-9AD4-045DB5619AC3}" type="slidenum">
               <a:rPr lang="it-IT" smtClean="0"/>
               <a:pPr/>
-              <a:t>‹N›</a:t>
+              <a:t>‹n.›</a:t>
             </a:fld>
             <a:endParaRPr lang="it-IT"/>
           </a:p>
@@ -4036,7 +4036,7 @@
   <p:timing>
     <p:tnLst>
       <p:par>
-        <p:cTn id="1" dur="indefinite" restart="never" nodeType="tmRoot"/>
+        <p:cTn xmlns:p14="http://schemas.microsoft.com/office/powerpoint/2010/main" id="1" dur="indefinite" restart="never" nodeType="tmRoot"/>
       </p:par>
     </p:tnLst>
   </p:timing>
@@ -4401,7 +4401,7 @@
           <p:nvPr>
             <p:extLst>
               <p:ext uri="{D42A27DB-BD31-4B8C-83A1-F6EECF244321}">
-                <p14:modId xmlns="" xmlns:p14="http://schemas.microsoft.com/office/powerpoint/2010/main" val="3478576524"/>
+                <p14:modId xmlns:p14="http://schemas.microsoft.com/office/powerpoint/2010/main" val="3478576524"/>
               </p:ext>
             </p:extLst>
           </p:nvPr>
@@ -4482,7 +4482,7 @@
           <p:nvPr>
             <p:extLst>
               <p:ext uri="{D42A27DB-BD31-4B8C-83A1-F6EECF244321}">
-                <p14:modId xmlns="" xmlns:p14="http://schemas.microsoft.com/office/powerpoint/2010/main" val="956586736"/>
+                <p14:modId xmlns:p14="http://schemas.microsoft.com/office/powerpoint/2010/main" val="956586736"/>
               </p:ext>
             </p:extLst>
           </p:nvPr>
@@ -4572,7 +4572,7 @@
           <a:blip r:embed="rId2">
             <a:extLst>
               <a:ext uri="{28A0092B-C50C-407E-A947-70E740481C1C}">
-                <a14:useLocalDpi xmlns="" xmlns:a14="http://schemas.microsoft.com/office/drawing/2010/main" val="0"/>
+                <a14:useLocalDpi xmlns:a14="http://schemas.microsoft.com/office/drawing/2010/main" val="0"/>
               </a:ext>
             </a:extLst>
           </a:blip>
@@ -4591,8 +4591,8 @@
           </a:prstGeom>
           <a:noFill/>
           <a:extLst>
-            <a:ext uri="{909E8E84-426E-40DD-AFC4-6F175D3DCCD1}">
-              <a14:hiddenFill xmlns="" xmlns:a14="http://schemas.microsoft.com/office/drawing/2010/main">
+            <a:ext uri="{909E8E84-426E-40dd-AFC4-6F175D3DCCD1}">
+              <a14:hiddenFill xmlns:a14="http://schemas.microsoft.com/office/drawing/2010/main">
                 <a:solidFill>
                   <a:srgbClr val="FFFFFF"/>
                 </a:solidFill>
@@ -4604,7 +4604,7 @@
     </p:spTree>
     <p:extLst>
       <p:ext uri="{BB962C8B-B14F-4D97-AF65-F5344CB8AC3E}">
-        <p14:creationId xmlns="" xmlns:p14="http://schemas.microsoft.com/office/powerpoint/2010/main" val="4165334171"/>
+        <p14:creationId xmlns:p14="http://schemas.microsoft.com/office/powerpoint/2010/main" val="4165334171"/>
       </p:ext>
     </p:extLst>
   </p:cSld>
@@ -4614,7 +4614,7 @@
   <p:timing>
     <p:tnLst>
       <p:par>
-        <p:cTn id="1" dur="indefinite" restart="never" nodeType="tmRoot"/>
+        <p:cTn xmlns:p14="http://schemas.microsoft.com/office/powerpoint/2010/main" id="1" dur="indefinite" restart="never" nodeType="tmRoot"/>
       </p:par>
     </p:tnLst>
   </p:timing>
@@ -4795,11 +4795,11 @@
   <p:clrMapOvr>
     <a:masterClrMapping/>
   </p:clrMapOvr>
-  <p:transition/>
+  <p:transition xmlns:p14="http://schemas.microsoft.com/office/powerpoint/2010/main"/>
   <p:timing>
     <p:tnLst>
       <p:par>
-        <p:cTn id="1" dur="indefinite" restart="never" nodeType="tmRoot"/>
+        <p:cTn xmlns:p14="http://schemas.microsoft.com/office/powerpoint/2010/main" id="1" dur="indefinite" restart="never" nodeType="tmRoot"/>
       </p:par>
     </p:tnLst>
   </p:timing>
@@ -4847,19 +4847,7 @@
           <a:p>
             <a:r>
               <a:rPr lang="it-IT" dirty="0" smtClean="0"/>
-              <a:t>Il genitore è l’utente che iscrive il proprio figlio </a:t>
-            </a:r>
-            <a:r>
-              <a:rPr lang="it-IT" dirty="0" smtClean="0"/>
-              <a:t>all’asilo</a:t>
-            </a:r>
-            <a:r>
-              <a:rPr lang="it-IT" dirty="0" smtClean="0"/>
-              <a:t> </a:t>
-            </a:r>
-            <a:r>
-              <a:rPr lang="it-IT" dirty="0" smtClean="0"/>
-              <a:t>e può essere di tre tipi:</a:t>
+              <a:t>Il genitore è l’utente che iscrive il proprio figlio all’asilo e può essere di tre tipi:</a:t>
             </a:r>
           </a:p>
           <a:p>
@@ -4869,15 +4857,7 @@
             </a:pPr>
             <a:r>
               <a:rPr lang="it-IT" dirty="0" smtClean="0"/>
-              <a:t> Personale </a:t>
-            </a:r>
-            <a:r>
-              <a:rPr lang="it-IT" dirty="0" smtClean="0"/>
-              <a:t>universitario e </a:t>
-            </a:r>
-            <a:r>
-              <a:rPr lang="it-IT" dirty="0" smtClean="0"/>
-              <a:t>studenti</a:t>
+              <a:t> Personale universitario e studenti</a:t>
             </a:r>
           </a:p>
           <a:p>
@@ -4887,11 +4867,7 @@
             </a:pPr>
             <a:r>
               <a:rPr lang="it-IT" dirty="0" smtClean="0"/>
-              <a:t> Residenti </a:t>
-            </a:r>
-            <a:r>
-              <a:rPr lang="it-IT" dirty="0" smtClean="0"/>
-              <a:t>di </a:t>
+              <a:t> Residenti di </a:t>
             </a:r>
             <a:r>
               <a:rPr lang="it-IT" dirty="0" err="1" smtClean="0"/>
@@ -4901,7 +4877,6 @@
               <a:rPr lang="it-IT" dirty="0" smtClean="0"/>
               <a:t> </a:t>
             </a:r>
-            <a:endParaRPr lang="it-IT" dirty="0" smtClean="0"/>
           </a:p>
           <a:p>
             <a:pPr>
@@ -4910,17 +4885,8 @@
             </a:pPr>
             <a:r>
               <a:rPr lang="it-IT" dirty="0" smtClean="0"/>
-              <a:t> </a:t>
-            </a:r>
-            <a:r>
-              <a:rPr lang="it-IT" dirty="0" smtClean="0"/>
-              <a:t>A</a:t>
-            </a:r>
-            <a:r>
-              <a:rPr lang="it-IT" dirty="0" smtClean="0"/>
-              <a:t>ltro utente</a:t>
-            </a:r>
-            <a:endParaRPr lang="it-IT" dirty="0" smtClean="0"/>
+              <a:t> Altro utente</a:t>
+            </a:r>
           </a:p>
           <a:p>
             <a:endParaRPr lang="it-IT" dirty="0" smtClean="0"/>
@@ -4950,38 +4916,20 @@
             </a:r>
             <a:r>
               <a:rPr lang="it-IT" dirty="0" smtClean="0"/>
-              <a:t>:</a:t>
-            </a:r>
+              <a:t>: Compilazione della domanda di iscrizione</a:t>
+            </a:r>
+          </a:p>
+          <a:p>
+            <a:endParaRPr lang="it-IT" dirty="0" smtClean="0"/>
+          </a:p>
+          <a:p>
+            <a:endParaRPr lang="it-IT" dirty="0" smtClean="0"/>
+          </a:p>
+          <a:p>
             <a:r>
               <a:rPr lang="it-IT" dirty="0" smtClean="0"/>
-              <a:t> Compilazione </a:t>
-            </a:r>
-            <a:r>
-              <a:rPr lang="it-IT" dirty="0" smtClean="0"/>
-              <a:t>della domanda di </a:t>
-            </a:r>
-            <a:r>
-              <a:rPr lang="it-IT" dirty="0" smtClean="0"/>
-              <a:t>iscrizione</a:t>
-            </a:r>
-            <a:endParaRPr lang="it-IT" dirty="0" smtClean="0"/>
-          </a:p>
-          <a:p>
-            <a:endParaRPr lang="it-IT" dirty="0" smtClean="0"/>
-          </a:p>
-          <a:p>
-            <a:endParaRPr lang="it-IT" dirty="0" smtClean="0"/>
-          </a:p>
-          <a:p>
-            <a:r>
-              <a:rPr lang="it-IT" dirty="0" smtClean="0"/>
-              <a:t>Ad </a:t>
-            </a:r>
-            <a:r>
-              <a:rPr lang="it-IT" dirty="0" smtClean="0"/>
-              <a:t>iscrizione completa queste sono le operazioni:</a:t>
-            </a:r>
-            <a:endParaRPr lang="it-IT" dirty="0" smtClean="0"/>
+              <a:t>Ad iscrizione completa queste sono le operazioni:</a:t>
+            </a:r>
           </a:p>
           <a:p>
             <a:pPr>
@@ -5059,11 +5007,11 @@
   <p:clrMapOvr>
     <a:masterClrMapping/>
   </p:clrMapOvr>
-  <p:transition/>
+  <p:transition xmlns:p14="http://schemas.microsoft.com/office/powerpoint/2010/main"/>
   <p:timing>
     <p:tnLst>
       <p:par>
-        <p:cTn id="1" dur="indefinite" restart="never" nodeType="tmRoot"/>
+        <p:cTn xmlns:p14="http://schemas.microsoft.com/office/powerpoint/2010/main" id="1" dur="indefinite" restart="never" nodeType="tmRoot"/>
       </p:par>
     </p:tnLst>
   </p:timing>
@@ -5141,19 +5089,11 @@
           <a:p>
             <a:r>
               <a:rPr lang="it-IT" b="1" dirty="0" smtClean="0"/>
-              <a:t>L’impiegato </a:t>
-            </a:r>
-            <a:r>
-              <a:rPr lang="it-IT" b="1" dirty="0" smtClean="0"/>
-              <a:t>del diritto allo studio </a:t>
+              <a:t>L’impiegato del diritto allo studio </a:t>
             </a:r>
             <a:r>
               <a:rPr lang="it-IT" dirty="0" smtClean="0"/>
-              <a:t>può </a:t>
-            </a:r>
-            <a:r>
-              <a:rPr lang="it-IT" dirty="0" smtClean="0"/>
-              <a:t>compiere sono:</a:t>
+              <a:t>può compiere sono:</a:t>
             </a:r>
           </a:p>
           <a:p>
@@ -5163,15 +5103,7 @@
             </a:pPr>
             <a:r>
               <a:rPr lang="it-IT" dirty="0" smtClean="0"/>
-              <a:t> </a:t>
-            </a:r>
-            <a:r>
-              <a:rPr lang="it-IT" dirty="0" smtClean="0"/>
-              <a:t>Inserimento </a:t>
-            </a:r>
-            <a:r>
-              <a:rPr lang="it-IT" dirty="0" smtClean="0"/>
-              <a:t>delle specifiche del bando</a:t>
+              <a:t> Inserimento delle specifiche del bando</a:t>
             </a:r>
           </a:p>
           <a:p>
@@ -5201,11 +5133,7 @@
             </a:pPr>
             <a:r>
               <a:rPr lang="it-IT" dirty="0" smtClean="0"/>
-              <a:t> Eliminazione </a:t>
-            </a:r>
-            <a:r>
-              <a:rPr lang="it-IT" dirty="0" smtClean="0"/>
-              <a:t>bambino</a:t>
+              <a:t> Eliminazione bambino</a:t>
             </a:r>
           </a:p>
           <a:p>
@@ -5225,19 +5153,7 @@
             </a:r>
             <a:r>
               <a:rPr lang="it-IT" dirty="0" smtClean="0"/>
-              <a:t>, </a:t>
-            </a:r>
-            <a:r>
-              <a:rPr lang="it-IT" dirty="0" smtClean="0"/>
-              <a:t>per questa fase, </a:t>
-            </a:r>
-            <a:r>
-              <a:rPr lang="it-IT" dirty="0" smtClean="0"/>
-              <a:t>può </a:t>
-            </a:r>
-            <a:r>
-              <a:rPr lang="it-IT" dirty="0" smtClean="0"/>
-              <a:t>fare come:</a:t>
+              <a:t>, per questa fase, può fare come:</a:t>
             </a:r>
           </a:p>
           <a:p>
@@ -5281,7 +5197,7 @@
   <p:timing>
     <p:tnLst>
       <p:par>
-        <p:cTn id="1" dur="indefinite" restart="never" nodeType="tmRoot"/>
+        <p:cTn xmlns:p14="http://schemas.microsoft.com/office/powerpoint/2010/main" id="1" dur="indefinite" restart="never" nodeType="tmRoot"/>
       </p:par>
     </p:tnLst>
   </p:timing>
@@ -5369,7 +5285,7 @@
   <p:timing>
     <p:tnLst>
       <p:par>
-        <p:cTn id="1" dur="indefinite" restart="never" nodeType="tmRoot"/>
+        <p:cTn xmlns:p14="http://schemas.microsoft.com/office/powerpoint/2010/main" id="1" dur="indefinite" restart="never" nodeType="tmRoot"/>
       </p:par>
     </p:tnLst>
   </p:timing>
@@ -5417,11 +5333,7 @@
           <a:p>
             <a:r>
               <a:rPr lang="it-IT" sz="2800" b="1" dirty="0" smtClean="0"/>
-              <a:t>Come e chi gestisce </a:t>
-            </a:r>
-            <a:r>
-              <a:rPr lang="it-IT" sz="2800" b="1" dirty="0" smtClean="0"/>
-              <a:t>gli iscritti</a:t>
+              <a:t>Come e chi gestisce gli iscritti</a:t>
             </a:r>
             <a:endParaRPr lang="it-IT" sz="2800" b="1" dirty="0"/>
           </a:p>
@@ -5461,27 +5373,7 @@
             </a:pPr>
             <a:r>
               <a:rPr lang="it-IT" dirty="0" smtClean="0"/>
-              <a:t> </a:t>
-            </a:r>
-            <a:r>
-              <a:rPr lang="it-IT" dirty="0" smtClean="0"/>
-              <a:t>Visualizzare </a:t>
-            </a:r>
-            <a:r>
-              <a:rPr lang="it-IT" dirty="0" smtClean="0"/>
-              <a:t>i </a:t>
-            </a:r>
-            <a:r>
-              <a:rPr lang="it-IT" dirty="0" smtClean="0"/>
-              <a:t>candidati </a:t>
-            </a:r>
-            <a:r>
-              <a:rPr lang="it-IT" dirty="0" smtClean="0"/>
-              <a:t>per </a:t>
-            </a:r>
-            <a:r>
-              <a:rPr lang="it-IT" dirty="0" smtClean="0"/>
-              <a:t>stato</a:t>
+              <a:t> Visualizzare i candidati per stato</a:t>
             </a:r>
           </a:p>
           <a:p>
@@ -5491,19 +5383,7 @@
             </a:pPr>
             <a:r>
               <a:rPr lang="it-IT" dirty="0" smtClean="0"/>
-              <a:t> </a:t>
-            </a:r>
-            <a:r>
-              <a:rPr lang="it-IT" dirty="0" smtClean="0"/>
-              <a:t>Visualizzare i candidati n </a:t>
-            </a:r>
-            <a:r>
-              <a:rPr lang="it-IT" dirty="0" smtClean="0"/>
-              <a:t>base ai servizi </a:t>
-            </a:r>
-            <a:r>
-              <a:rPr lang="it-IT" dirty="0" smtClean="0"/>
-              <a:t>richiesti </a:t>
+              <a:t> Visualizzare i candidati n base ai servizi richiesti </a:t>
             </a:r>
           </a:p>
           <a:p>
@@ -5513,29 +5393,11 @@
             </a:pPr>
             <a:r>
               <a:rPr lang="it-IT" dirty="0" smtClean="0"/>
-              <a:t> </a:t>
-            </a:r>
-            <a:r>
-              <a:rPr lang="it-IT" dirty="0" smtClean="0"/>
-              <a:t>Assegnargli </a:t>
-            </a:r>
-            <a:r>
-              <a:rPr lang="it-IT" dirty="0" smtClean="0"/>
-              <a:t>una </a:t>
+              <a:t> Assegnargli una </a:t>
             </a:r>
             <a:r>
               <a:rPr lang="it-IT" dirty="0" smtClean="0"/>
               <a:t>classe</a:t>
-            </a:r>
-            <a:endParaRPr lang="it-IT" dirty="0" smtClean="0"/>
-          </a:p>
-          <a:p>
-            <a:endParaRPr lang="it-IT" dirty="0" smtClean="0"/>
-          </a:p>
-          <a:p>
-            <a:r>
-              <a:rPr lang="it-IT" dirty="0" smtClean="0"/>
-              <a:t>Direttore:</a:t>
             </a:r>
           </a:p>
           <a:p>
@@ -5543,14 +5405,14 @@
               <a:buFont typeface="Arial" pitchFamily="34" charset="0"/>
               <a:buChar char="•"/>
             </a:pPr>
+            <a:endParaRPr lang="it-IT" dirty="0"/>
+          </a:p>
+          <a:p>
             <a:r>
               <a:rPr lang="it-IT" dirty="0" smtClean="0"/>
-              <a:t> </a:t>
-            </a:r>
-            <a:r>
-              <a:rPr lang="it-IT" dirty="0" smtClean="0"/>
-              <a:t>Aggiungi classe</a:t>
-            </a:r>
+              <a:t>Direttore:</a:t>
+            </a:r>
+            <a:endParaRPr lang="it-IT" dirty="0" smtClean="0"/>
           </a:p>
           <a:p>
             <a:pPr>
@@ -5558,31 +5420,13 @@
               <a:buChar char="•"/>
             </a:pPr>
             <a:r>
+              <a:rPr lang="it-IT" smtClean="0"/>
+              <a:t> Aggiungi </a:t>
+            </a:r>
+            <a:r>
               <a:rPr lang="it-IT" dirty="0" smtClean="0"/>
-              <a:t> </a:t>
-            </a:r>
-            <a:r>
-              <a:rPr lang="it-IT" dirty="0" smtClean="0"/>
-              <a:t>Elimina classe</a:t>
-            </a:r>
-          </a:p>
-          <a:p>
-            <a:endParaRPr lang="it-IT" dirty="0" smtClean="0"/>
-          </a:p>
-          <a:p>
-            <a:r>
-              <a:rPr lang="it-IT" dirty="0" smtClean="0"/>
-              <a:t>Delegato </a:t>
-            </a:r>
-            <a:r>
-              <a:rPr lang="it-IT" dirty="0" smtClean="0"/>
-              <a:t>del </a:t>
-            </a:r>
-            <a:r>
-              <a:rPr lang="it-IT" dirty="0" smtClean="0"/>
-              <a:t>rettore:</a:t>
-            </a:r>
-            <a:endParaRPr lang="it-IT" dirty="0" smtClean="0"/>
+              <a:t>classe</a:t>
+            </a:r>
           </a:p>
           <a:p>
             <a:pPr>
@@ -5591,7 +5435,16 @@
             </a:pPr>
             <a:r>
               <a:rPr lang="it-IT" dirty="0" smtClean="0"/>
-              <a:t> Conferma assegnazione classe</a:t>
+              <a:t> Elimina classe</a:t>
+            </a:r>
+          </a:p>
+          <a:p>
+            <a:endParaRPr lang="it-IT" dirty="0" smtClean="0"/>
+          </a:p>
+          <a:p>
+            <a:r>
+              <a:rPr lang="it-IT" dirty="0" smtClean="0"/>
+              <a:t>Delegato del rettore:</a:t>
             </a:r>
           </a:p>
           <a:p>
@@ -5601,13 +5454,18 @@
             </a:pPr>
             <a:r>
               <a:rPr lang="it-IT" dirty="0" smtClean="0"/>
-              <a:t> </a:t>
-            </a:r>
+              <a:t> Conferma assegnazione classe</a:t>
+            </a:r>
+          </a:p>
+          <a:p>
+            <a:pPr>
+              <a:buFont typeface="Arial" pitchFamily="34" charset="0"/>
+              <a:buChar char="•"/>
+            </a:pPr>
             <a:r>
               <a:rPr lang="it-IT" dirty="0" smtClean="0"/>
-              <a:t>Rifiuta assegnazione classe</a:t>
-            </a:r>
-            <a:endParaRPr lang="it-IT" dirty="0" smtClean="0"/>
+              <a:t> Rifiuta assegnazione classe</a:t>
+            </a:r>
           </a:p>
         </p:txBody>
       </p:sp>
@@ -5619,7 +5477,7 @@
   <p:timing>
     <p:tnLst>
       <p:par>
-        <p:cTn id="1" dur="indefinite" restart="never" nodeType="tmRoot"/>
+        <p:cTn xmlns:p14="http://schemas.microsoft.com/office/powerpoint/2010/main" id="1" dur="indefinite" restart="never" nodeType="tmRoot"/>
       </p:par>
     </p:tnLst>
   </p:timing>
@@ -5707,7 +5565,7 @@
   <p:timing>
     <p:tnLst>
       <p:par>
-        <p:cTn id="1" dur="indefinite" restart="never" nodeType="tmRoot"/>
+        <p:cTn xmlns:p14="http://schemas.microsoft.com/office/powerpoint/2010/main" id="1" dur="indefinite" restart="never" nodeType="tmRoot"/>
       </p:par>
     </p:tnLst>
   </p:timing>
@@ -5739,8 +5597,8 @@
         </p:nvSpPr>
         <p:spPr>
           <a:xfrm>
-            <a:off x="3214678" y="500042"/>
-            <a:ext cx="2573590" cy="830997"/>
+            <a:off x="1883362" y="500042"/>
+            <a:ext cx="5236229" cy="830997"/>
           </a:xfrm>
           <a:prstGeom prst="rect">
             <a:avLst/>
@@ -5758,14 +5616,56 @@
               <a:rPr lang="it-IT" sz="4800" b="1" dirty="0" smtClean="0">
                 <a:latin typeface="+mj-lt"/>
               </a:rPr>
-              <a:t>Obiettivo</a:t>
-            </a:r>
-          </a:p>
-        </p:txBody>
-      </p:sp>
-      <p:sp>
-        <p:nvSpPr>
-          <p:cNvPr id="10" name="Content Placeholder 3"/>
+              <a:t>Obiettivo </a:t>
+            </a:r>
+            <a:r>
+              <a:rPr lang="it-IT" sz="4800" b="1" dirty="0">
+                <a:latin typeface="+mj-lt"/>
+              </a:rPr>
+              <a:t>P</a:t>
+            </a:r>
+            <a:r>
+              <a:rPr lang="it-IT" sz="4800" b="1" dirty="0" smtClean="0">
+                <a:latin typeface="+mj-lt"/>
+              </a:rPr>
+              <a:t>rincipale</a:t>
+            </a:r>
+          </a:p>
+        </p:txBody>
+      </p:sp>
+      <p:sp>
+        <p:nvSpPr>
+          <p:cNvPr id="6" name="CasellaDiTesto 5"/>
+          <p:cNvSpPr txBox="1"/>
+          <p:nvPr/>
+        </p:nvSpPr>
+        <p:spPr>
+          <a:xfrm>
+            <a:off x="395536" y="4293096"/>
+            <a:ext cx="8286808" cy="954107"/>
+          </a:xfrm>
+          <a:prstGeom prst="rect">
+            <a:avLst/>
+          </a:prstGeom>
+          <a:noFill/>
+        </p:spPr>
+        <p:txBody>
+          <a:bodyPr wrap="square" rtlCol="0">
+            <a:spAutoFit/>
+          </a:bodyPr>
+          <a:lstStyle/>
+          <a:p>
+            <a:r>
+              <a:rPr lang="it-IT" sz="2800" dirty="0" smtClean="0"/>
+              <a:t>A dirlo sembra una cosa molto semplice ma non è stato affatto cosi.</a:t>
+            </a:r>
+            <a:endParaRPr lang="it-IT" sz="2800" dirty="0"/>
+          </a:p>
+        </p:txBody>
+      </p:sp>
+      <p:sp>
+        <p:nvSpPr>
+          <p:cNvPr id="5" name="Content Placeholder 3"/>
           <p:cNvSpPr txBox="1">
             <a:spLocks/>
           </p:cNvSpPr>
@@ -5773,8 +5673,8 @@
         </p:nvSpPr>
         <p:spPr>
           <a:xfrm>
-            <a:off x="323528" y="1795352"/>
-            <a:ext cx="8534752" cy="2276590"/>
+            <a:off x="539552" y="2564904"/>
+            <a:ext cx="7920880" cy="1656184"/>
           </a:xfrm>
           <a:prstGeom prst="rect">
             <a:avLst/>
@@ -5943,95 +5843,35 @@
             </a:lvl9pPr>
           </a:lstStyle>
           <a:p>
-            <a:pPr marL="0" indent="0">
-              <a:buNone/>
-            </a:pPr>
-            <a:r>
-              <a:rPr lang="en-US" dirty="0" smtClean="0"/>
-              <a:t>Il </a:t>
-            </a:r>
-            <a:r>
-              <a:rPr lang="en-US" dirty="0" err="1" smtClean="0"/>
-              <a:t>sistema</a:t>
-            </a:r>
-            <a:r>
-              <a:rPr lang="en-US" dirty="0" smtClean="0"/>
-              <a:t>, </a:t>
-            </a:r>
-            <a:r>
-              <a:rPr lang="en-US" dirty="0" err="1" smtClean="0"/>
-              <a:t>cosi</a:t>
-            </a:r>
-            <a:r>
-              <a:rPr lang="en-US" dirty="0" smtClean="0"/>
-              <a:t> come </a:t>
-            </a:r>
-            <a:r>
-              <a:rPr lang="en-US" dirty="0" err="1" smtClean="0"/>
-              <a:t>pensato</a:t>
-            </a:r>
-            <a:r>
-              <a:rPr lang="en-US" dirty="0" smtClean="0"/>
-              <a:t> e </a:t>
-            </a:r>
             <a:r>
               <a:rPr lang="it-IT" dirty="0" smtClean="0"/>
-              <a:t>sviluppato, ha raggiunto e risolto con successo un dei tanti obiettivi preposti, nello specifico abbiamo semplificato la presentazione delle richieste da parte degli utenti e l'elaborazione di queste da parte del sistema.</a:t>
-            </a:r>
-          </a:p>
-          <a:p>
-            <a:pPr marL="0" indent="0">
-              <a:buNone/>
-            </a:pPr>
-            <a:endParaRPr lang="it-IT" dirty="0"/>
-          </a:p>
-        </p:txBody>
-      </p:sp>
-      <p:sp>
-        <p:nvSpPr>
-          <p:cNvPr id="6" name="CasellaDiTesto 5"/>
-          <p:cNvSpPr txBox="1"/>
-          <p:nvPr/>
-        </p:nvSpPr>
-        <p:spPr>
-          <a:xfrm>
-            <a:off x="428596" y="4786322"/>
-            <a:ext cx="8286808" cy="954107"/>
-          </a:xfrm>
-          <a:prstGeom prst="rect">
-            <a:avLst/>
-          </a:prstGeom>
-          <a:noFill/>
-        </p:spPr>
-        <p:txBody>
-          <a:bodyPr wrap="square" rtlCol="0">
-            <a:spAutoFit/>
-          </a:bodyPr>
-          <a:lstStyle/>
-          <a:p>
-            <a:r>
-              <a:rPr lang="it-IT" sz="2800" dirty="0" smtClean="0"/>
-              <a:t>A dirlo sembra una cosa molto semplice ma non è stato affatto cosi.</a:t>
-            </a:r>
-            <a:endParaRPr lang="it-IT" sz="2800" dirty="0"/>
+              <a:t>Semplificazione della presentazione ed elaborazione delle richieste da parte degli utenti</a:t>
+            </a:r>
+          </a:p>
+          <a:p>
+            <a:pPr lvl="1"/>
+            <a:r>
+              <a:rPr lang="it-IT" dirty="0" smtClean="0"/>
+              <a:t>Obiettivo raggiunto e risolto con successo.</a:t>
+            </a:r>
           </a:p>
         </p:txBody>
       </p:sp>
     </p:spTree>
     <p:extLst>
       <p:ext uri="{BB962C8B-B14F-4D97-AF65-F5344CB8AC3E}">
-        <p14:creationId xmlns="" xmlns:p14="http://schemas.microsoft.com/office/powerpoint/2010/main" val="155874689"/>
+        <p14:creationId xmlns:p14="http://schemas.microsoft.com/office/powerpoint/2010/main" val="155874689"/>
       </p:ext>
     </p:extLst>
   </p:cSld>
   <p:clrMapOvr>
     <a:masterClrMapping/>
   </p:clrMapOvr>
-  <p:transition spd="med"/>
+  <p:transition xmlns:p14="http://schemas.microsoft.com/office/powerpoint/2010/main" spd="med"/>
   <p:timing>
     <p:tnLst>
       <p:par>
-        <p:cTn id="1" dur="indefinite" restart="never" nodeType="tmRoot"/>
+        <p:cTn xmlns:p14="http://schemas.microsoft.com/office/powerpoint/2010/main" id="1" dur="indefinite" restart="never" nodeType="tmRoot"/>
       </p:par>
     </p:tnLst>
   </p:timing>
@@ -6063,7 +5903,7 @@
         </p:nvSpPr>
         <p:spPr>
           <a:xfrm>
-            <a:off x="642910" y="1357298"/>
+            <a:off x="611560" y="1052736"/>
             <a:ext cx="2143140" cy="830997"/>
           </a:xfrm>
           <a:prstGeom prst="rect">
@@ -6087,140 +5927,228 @@
       </p:sp>
       <p:sp>
         <p:nvSpPr>
-          <p:cNvPr id="4" name="CasellaDiTesto 3"/>
-          <p:cNvSpPr txBox="1"/>
+          <p:cNvPr id="5" name="Content Placeholder 3"/>
+          <p:cNvSpPr txBox="1">
+            <a:spLocks/>
+          </p:cNvSpPr>
           <p:nvPr/>
         </p:nvSpPr>
         <p:spPr>
           <a:xfrm>
-            <a:off x="571472" y="2786058"/>
-            <a:ext cx="8072494" cy="2862322"/>
+            <a:off x="683568" y="2636912"/>
+            <a:ext cx="7920880" cy="3528392"/>
           </a:xfrm>
           <a:prstGeom prst="rect">
             <a:avLst/>
           </a:prstGeom>
-          <a:noFill/>
         </p:spPr>
         <p:txBody>
-          <a:bodyPr wrap="square" rtlCol="0">
-            <a:spAutoFit/>
-          </a:bodyPr>
-          <a:lstStyle/>
+          <a:bodyPr tIns="0"/>
+          <a:lstStyle>
+            <a:lvl1pPr marL="274320" indent="-274320" algn="l" rtl="0" eaLnBrk="1" latinLnBrk="0" hangingPunct="1">
+              <a:spcBef>
+                <a:spcPct val="20000"/>
+              </a:spcBef>
+              <a:buClrTx/>
+              <a:buSzPct val="95000"/>
+              <a:buFont typeface="Wingdings" pitchFamily="2" charset="2"/>
+              <a:buChar char="v"/>
+              <a:defRPr kumimoji="0" sz="2800" kern="1200">
+                <a:solidFill>
+                  <a:schemeClr val="tx1"/>
+                </a:solidFill>
+                <a:latin typeface="+mn-lt"/>
+                <a:ea typeface="+mn-ea"/>
+                <a:cs typeface="+mn-cs"/>
+              </a:defRPr>
+            </a:lvl1pPr>
+            <a:lvl2pPr marL="640080" indent="-246888" algn="l" rtl="0" eaLnBrk="1" latinLnBrk="0" hangingPunct="1">
+              <a:spcBef>
+                <a:spcPct val="20000"/>
+              </a:spcBef>
+              <a:buClrTx/>
+              <a:buSzPct val="85000"/>
+              <a:buFont typeface="Courier New" pitchFamily="49" charset="0"/>
+              <a:buChar char="o"/>
+              <a:defRPr kumimoji="0" sz="2600" kern="1200">
+                <a:solidFill>
+                  <a:schemeClr val="tx1"/>
+                </a:solidFill>
+                <a:latin typeface="+mn-lt"/>
+                <a:ea typeface="+mn-ea"/>
+                <a:cs typeface="+mn-cs"/>
+              </a:defRPr>
+            </a:lvl2pPr>
+            <a:lvl3pPr marL="914400" indent="-246888" algn="l" rtl="0" eaLnBrk="1" latinLnBrk="0" hangingPunct="1">
+              <a:spcBef>
+                <a:spcPct val="20000"/>
+              </a:spcBef>
+              <a:buClrTx/>
+              <a:buSzPct val="70000"/>
+              <a:buFont typeface="Wingdings 2"/>
+              <a:buChar char=""/>
+              <a:defRPr kumimoji="0" sz="2400" kern="1200">
+                <a:solidFill>
+                  <a:schemeClr val="tx1"/>
+                </a:solidFill>
+                <a:latin typeface="+mn-lt"/>
+                <a:ea typeface="+mn-ea"/>
+                <a:cs typeface="+mn-cs"/>
+              </a:defRPr>
+            </a:lvl3pPr>
+            <a:lvl4pPr marL="1188720" indent="-210312" algn="l" rtl="0" eaLnBrk="1" latinLnBrk="0" hangingPunct="1">
+              <a:spcBef>
+                <a:spcPct val="20000"/>
+              </a:spcBef>
+              <a:buClrTx/>
+              <a:buSzPct val="65000"/>
+              <a:buFont typeface="Wingdings 2"/>
+              <a:buChar char=""/>
+              <a:defRPr kumimoji="0" sz="2000" kern="1200">
+                <a:solidFill>
+                  <a:schemeClr val="tx1"/>
+                </a:solidFill>
+                <a:latin typeface="+mn-lt"/>
+                <a:ea typeface="+mn-ea"/>
+                <a:cs typeface="+mn-cs"/>
+              </a:defRPr>
+            </a:lvl4pPr>
+            <a:lvl5pPr marL="1463040" indent="-210312" algn="l" rtl="0" eaLnBrk="1" latinLnBrk="0" hangingPunct="1">
+              <a:spcBef>
+                <a:spcPct val="20000"/>
+              </a:spcBef>
+              <a:buClrTx/>
+              <a:buSzPct val="65000"/>
+              <a:buFont typeface="Wingdings 2"/>
+              <a:buChar char=""/>
+              <a:defRPr kumimoji="0" sz="1800" kern="1200">
+                <a:solidFill>
+                  <a:schemeClr val="tx1"/>
+                </a:solidFill>
+                <a:latin typeface="+mn-lt"/>
+                <a:ea typeface="+mn-ea"/>
+                <a:cs typeface="+mn-cs"/>
+              </a:defRPr>
+            </a:lvl5pPr>
+            <a:lvl6pPr marL="1737360" indent="-210312" algn="l" rtl="0" eaLnBrk="1" latinLnBrk="0" hangingPunct="1">
+              <a:spcBef>
+                <a:spcPct val="20000"/>
+              </a:spcBef>
+              <a:buClr>
+                <a:schemeClr val="accent5"/>
+              </a:buClr>
+              <a:buSzPct val="80000"/>
+              <a:buFont typeface="Wingdings 2"/>
+              <a:buChar char=""/>
+              <a:defRPr kumimoji="0" sz="1800" kern="1200">
+                <a:solidFill>
+                  <a:schemeClr val="tx1"/>
+                </a:solidFill>
+                <a:latin typeface="+mn-lt"/>
+                <a:ea typeface="+mn-ea"/>
+                <a:cs typeface="+mn-cs"/>
+              </a:defRPr>
+            </a:lvl6pPr>
+            <a:lvl7pPr marL="1920240" indent="-182880" algn="l" rtl="0" eaLnBrk="1" latinLnBrk="0" hangingPunct="1">
+              <a:spcBef>
+                <a:spcPct val="20000"/>
+              </a:spcBef>
+              <a:buClr>
+                <a:schemeClr val="accent6"/>
+              </a:buClr>
+              <a:buSzPct val="80000"/>
+              <a:buFont typeface="Wingdings 2"/>
+              <a:buChar char=""/>
+              <a:defRPr kumimoji="0" sz="1600" kern="1200" baseline="0">
+                <a:solidFill>
+                  <a:schemeClr val="tx1"/>
+                </a:solidFill>
+                <a:latin typeface="+mn-lt"/>
+                <a:ea typeface="+mn-ea"/>
+                <a:cs typeface="+mn-cs"/>
+              </a:defRPr>
+            </a:lvl7pPr>
+            <a:lvl8pPr marL="2194560" indent="-182880" algn="l" rtl="0" eaLnBrk="1" latinLnBrk="0" hangingPunct="1">
+              <a:spcBef>
+                <a:spcPct val="20000"/>
+              </a:spcBef>
+              <a:buClr>
+                <a:schemeClr val="tx2"/>
+              </a:buClr>
+              <a:buChar char="•"/>
+              <a:defRPr kumimoji="0" sz="1600" kern="1200">
+                <a:solidFill>
+                  <a:schemeClr val="tx1"/>
+                </a:solidFill>
+                <a:latin typeface="+mn-lt"/>
+                <a:ea typeface="+mn-ea"/>
+                <a:cs typeface="+mn-cs"/>
+              </a:defRPr>
+            </a:lvl8pPr>
+            <a:lvl9pPr marL="2468880" indent="-182880" algn="l" rtl="0" eaLnBrk="1" latinLnBrk="0" hangingPunct="1">
+              <a:spcBef>
+                <a:spcPct val="20000"/>
+              </a:spcBef>
+              <a:buClr>
+                <a:schemeClr val="tx2"/>
+              </a:buClr>
+              <a:buFontTx/>
+              <a:buChar char="•"/>
+              <a:defRPr kumimoji="0" sz="1400" kern="1200" baseline="0">
+                <a:solidFill>
+                  <a:schemeClr val="tx1"/>
+                </a:solidFill>
+                <a:latin typeface="+mn-lt"/>
+                <a:ea typeface="+mn-ea"/>
+                <a:cs typeface="+mn-cs"/>
+              </a:defRPr>
+            </a:lvl9pPr>
+          </a:lstStyle>
           <a:p>
             <a:r>
               <a:rPr lang="it-IT" dirty="0" smtClean="0"/>
-              <a:t>Perché non fare un sistema che ti permetta di presentare online la domanda di iscrizione per il proprio bambino.</a:t>
-            </a:r>
-          </a:p>
-          <a:p>
+              <a:t>Sistema di presentazione on-line delle domande di iscrizione per il proprio bambino</a:t>
+            </a:r>
+          </a:p>
+          <a:p>
+            <a:pPr lvl="1"/>
+            <a:r>
+              <a:rPr lang="it-IT" dirty="0" smtClean="0"/>
+              <a:t>Sito internet che permette di:</a:t>
+            </a:r>
+          </a:p>
+          <a:p>
+            <a:pPr lvl="2"/>
+            <a:r>
+              <a:rPr lang="it-IT" dirty="0" smtClean="0"/>
+              <a:t>Consultare il bando</a:t>
+            </a:r>
+          </a:p>
+          <a:p>
+            <a:pPr lvl="2"/>
+            <a:r>
+              <a:rPr lang="it-IT" dirty="0" smtClean="0"/>
+              <a:t>Compilare una eventuale domanda di iscrizione online </a:t>
+            </a:r>
+            <a:r>
+              <a:rPr lang="it-IT" b="1" dirty="0" smtClean="0"/>
+              <a:t>(completa di tutti i campi)</a:t>
+            </a:r>
             <a:endParaRPr lang="it-IT" dirty="0" smtClean="0"/>
           </a:p>
           <a:p>
+            <a:pPr lvl="2"/>
             <a:r>
               <a:rPr lang="it-IT" dirty="0" smtClean="0"/>
-              <a:t>L’idea realizzata è stata quella di creare un sito internet che </a:t>
-            </a:r>
+              <a:t>Inviare la domanda compilata</a:t>
+            </a:r>
+          </a:p>
+          <a:p>
+            <a:pPr lvl="2"/>
             <a:r>
               <a:rPr lang="it-IT" dirty="0" smtClean="0"/>
-              <a:t>permettesse di:</a:t>
-            </a:r>
-          </a:p>
-          <a:p>
-            <a:pPr>
-              <a:buFont typeface="Arial" pitchFamily="34" charset="0"/>
-              <a:buChar char="•"/>
-            </a:pPr>
-            <a:r>
-              <a:rPr lang="it-IT" dirty="0" smtClean="0"/>
-              <a:t> Consultare </a:t>
-            </a:r>
-            <a:r>
-              <a:rPr lang="it-IT" dirty="0" smtClean="0"/>
-              <a:t>il </a:t>
-            </a:r>
-            <a:r>
-              <a:rPr lang="it-IT" dirty="0" smtClean="0"/>
-              <a:t>bando</a:t>
-            </a:r>
-            <a:endParaRPr lang="it-IT" dirty="0" smtClean="0"/>
-          </a:p>
-          <a:p>
-            <a:pPr>
-              <a:buFont typeface="Arial" pitchFamily="34" charset="0"/>
-              <a:buChar char="•"/>
-            </a:pPr>
-            <a:r>
-              <a:rPr lang="it-IT" dirty="0" smtClean="0"/>
-              <a:t> Compilare una eventuale </a:t>
-            </a:r>
-            <a:r>
-              <a:rPr lang="it-IT" dirty="0" smtClean="0"/>
-              <a:t>domanda di iscrizione </a:t>
-            </a:r>
-            <a:r>
-              <a:rPr lang="it-IT" dirty="0" smtClean="0"/>
-              <a:t>on-line (</a:t>
-            </a:r>
-            <a:r>
-              <a:rPr lang="it-IT" b="1" dirty="0" smtClean="0"/>
-              <a:t>completa </a:t>
-            </a:r>
-            <a:r>
-              <a:rPr lang="it-IT" b="1" dirty="0" smtClean="0"/>
-              <a:t>di tutti i </a:t>
-            </a:r>
-            <a:r>
-              <a:rPr lang="it-IT" b="1" dirty="0" smtClean="0"/>
-              <a:t>campi</a:t>
-            </a:r>
-            <a:r>
-              <a:rPr lang="it-IT" dirty="0" smtClean="0"/>
-              <a:t>)</a:t>
-            </a:r>
-            <a:endParaRPr lang="it-IT" dirty="0" smtClean="0"/>
-          </a:p>
-          <a:p>
-            <a:pPr>
-              <a:buFont typeface="Arial" pitchFamily="34" charset="0"/>
-              <a:buChar char="•"/>
-            </a:pPr>
-            <a:r>
-              <a:rPr lang="it-IT" dirty="0" smtClean="0"/>
-              <a:t> </a:t>
-            </a:r>
-            <a:r>
-              <a:rPr lang="it-IT" dirty="0" smtClean="0"/>
-              <a:t>In</a:t>
-            </a:r>
-            <a:r>
-              <a:rPr lang="it-IT" dirty="0" smtClean="0"/>
-              <a:t>via </a:t>
-            </a:r>
-            <a:r>
-              <a:rPr lang="it-IT" dirty="0" smtClean="0"/>
-              <a:t>la </a:t>
-            </a:r>
-            <a:r>
-              <a:rPr lang="it-IT" dirty="0" smtClean="0"/>
-              <a:t>domanda compilata</a:t>
-            </a:r>
-          </a:p>
-          <a:p>
-            <a:pPr>
-              <a:buFont typeface="Arial" pitchFamily="34" charset="0"/>
-              <a:buChar char="•"/>
-            </a:pPr>
-            <a:r>
-              <a:rPr lang="it-IT" dirty="0" smtClean="0"/>
-              <a:t> Mostrare la graduatoria</a:t>
-            </a:r>
-            <a:endParaRPr lang="it-IT" dirty="0" smtClean="0"/>
-          </a:p>
-          <a:p>
-            <a:endParaRPr lang="it-IT" dirty="0" smtClean="0"/>
-          </a:p>
-          <a:p>
-            <a:endParaRPr lang="it-IT" dirty="0"/>
+              <a:t>Mostrare la graduatoria</a:t>
+            </a:r>
           </a:p>
         </p:txBody>
       </p:sp>
@@ -6232,7 +6160,7 @@
   <p:timing>
     <p:tnLst>
       <p:par>
-        <p:cTn id="1" dur="indefinite" restart="never" nodeType="tmRoot"/>
+        <p:cTn xmlns:p14="http://schemas.microsoft.com/office/powerpoint/2010/main" id="1" dur="indefinite" restart="never" nodeType="tmRoot"/>
       </p:par>
     </p:tnLst>
   </p:timing>
@@ -6350,7 +6278,7 @@
   <p:timing>
     <p:tnLst>
       <p:par>
-        <p:cTn id="1" dur="indefinite" restart="never" nodeType="tmRoot"/>
+        <p:cTn xmlns:p14="http://schemas.microsoft.com/office/powerpoint/2010/main" id="1" dur="indefinite" restart="never" nodeType="tmRoot"/>
       </p:par>
     </p:tnLst>
   </p:timing>
@@ -6469,7 +6397,7 @@
   <p:timing>
     <p:tnLst>
       <p:par>
-        <p:cTn id="1" dur="indefinite" restart="never" nodeType="tmRoot"/>
+        <p:cTn xmlns:p14="http://schemas.microsoft.com/office/powerpoint/2010/main" id="1" dur="indefinite" restart="never" nodeType="tmRoot"/>
       </p:par>
     </p:tnLst>
   </p:timing>
@@ -6548,7 +6476,7 @@
   <p:timing>
     <p:tnLst>
       <p:par>
-        <p:cTn id="1" dur="indefinite" restart="never" nodeType="tmRoot"/>
+        <p:cTn xmlns:p14="http://schemas.microsoft.com/office/powerpoint/2010/main" id="1" dur="indefinite" restart="never" nodeType="tmRoot"/>
       </p:par>
     </p:tnLst>
   </p:timing>
@@ -6580,7 +6508,7 @@
         </p:nvSpPr>
         <p:spPr>
           <a:xfrm>
-            <a:off x="285720" y="1571612"/>
+            <a:off x="251520" y="1268760"/>
             <a:ext cx="2786082" cy="830997"/>
           </a:xfrm>
           <a:prstGeom prst="rect">
@@ -6596,7 +6524,7 @@
           <a:p>
             <a:r>
               <a:rPr lang="it-IT" sz="4800" b="1" dirty="0" smtClean="0"/>
-              <a:t>Idea V.2 …</a:t>
+              <a:t>Idea V.2</a:t>
             </a:r>
             <a:endParaRPr lang="it-IT" sz="4800" b="1" dirty="0"/>
           </a:p>
@@ -6610,7 +6538,7 @@
         </p:nvSpPr>
         <p:spPr>
           <a:xfrm>
-            <a:off x="428596" y="2571744"/>
+            <a:off x="251520" y="2636912"/>
             <a:ext cx="8286808" cy="1754326"/>
           </a:xfrm>
           <a:prstGeom prst="rect">
@@ -6626,23 +6554,11 @@
           <a:p>
             <a:r>
               <a:rPr lang="it-IT" dirty="0" smtClean="0"/>
-              <a:t>La versione precedente non ha soddisfatto il committente quindi abbiamo pensato </a:t>
-            </a:r>
-            <a:r>
-              <a:rPr lang="it-IT" dirty="0" smtClean="0"/>
-              <a:t>di</a:t>
-            </a:r>
-            <a:r>
-              <a:rPr lang="it-IT" dirty="0" smtClean="0"/>
-              <a:t> </a:t>
+              <a:t>La versione precedente non ha soddisfatto il committente quindi abbiamo pensato di </a:t>
             </a:r>
             <a:r>
               <a:rPr lang="it-IT" b="1" dirty="0" smtClean="0"/>
-              <a:t>dividere l’iscrizione in due </a:t>
-            </a:r>
-            <a:r>
-              <a:rPr lang="it-IT" b="1" dirty="0" smtClean="0"/>
-              <a:t>parti:</a:t>
+              <a:t>dividere l’iscrizione in due parti:</a:t>
             </a:r>
           </a:p>
           <a:p>
@@ -6655,15 +6571,7 @@
             </a:pPr>
             <a:r>
               <a:rPr lang="it-IT" dirty="0" smtClean="0"/>
-              <a:t>Creazione </a:t>
-            </a:r>
-            <a:r>
-              <a:rPr lang="it-IT" dirty="0" smtClean="0"/>
-              <a:t>di un </a:t>
-            </a:r>
-            <a:r>
-              <a:rPr lang="it-IT" dirty="0" smtClean="0"/>
-              <a:t>account</a:t>
+              <a:t>Creazione di un account</a:t>
             </a:r>
           </a:p>
           <a:p>
@@ -6673,17 +6581,8 @@
             </a:pPr>
             <a:r>
               <a:rPr lang="it-IT" dirty="0" smtClean="0"/>
-              <a:t>Compilazione </a:t>
-            </a:r>
-            <a:r>
-              <a:rPr lang="it-IT" dirty="0" smtClean="0"/>
-              <a:t>della domanda di </a:t>
-            </a:r>
-            <a:r>
-              <a:rPr lang="it-IT" dirty="0" smtClean="0"/>
-              <a:t>iscrizione </a:t>
-            </a:r>
-            <a:endParaRPr lang="it-IT" dirty="0" smtClean="0"/>
+              <a:t>Compilazione della domanda di iscrizione </a:t>
+            </a:r>
           </a:p>
           <a:p>
             <a:endParaRPr lang="it-IT" dirty="0" smtClean="0"/>
@@ -6698,7 +6597,7 @@
   <p:timing>
     <p:tnLst>
       <p:par>
-        <p:cTn id="1" dur="indefinite" restart="never" nodeType="tmRoot"/>
+        <p:cTn xmlns:p14="http://schemas.microsoft.com/office/powerpoint/2010/main" id="1" dur="indefinite" restart="never" nodeType="tmRoot"/>
       </p:par>
     </p:tnLst>
   </p:timing>
@@ -6816,7 +6715,7 @@
   <p:timing>
     <p:tnLst>
       <p:par>
-        <p:cTn id="1" dur="indefinite" restart="never" nodeType="tmRoot"/>
+        <p:cTn xmlns:p14="http://schemas.microsoft.com/office/powerpoint/2010/main" id="1" dur="indefinite" restart="never" nodeType="tmRoot"/>
       </p:par>
     </p:tnLst>
   </p:timing>
@@ -6904,7 +6803,7 @@
   <p:timing>
     <p:tnLst>
       <p:par>
-        <p:cTn id="1" dur="indefinite" restart="never" nodeType="tmRoot"/>
+        <p:cTn xmlns:p14="http://schemas.microsoft.com/office/powerpoint/2010/main" id="1" dur="indefinite" restart="never" nodeType="tmRoot"/>
       </p:par>
     </p:tnLst>
   </p:timing>

</xml_diff>